<commit_message>
Atualizando Doc de resumos
</commit_message>
<xml_diff>
--- a/docs/JS Avançado 1-resumo.pptx
+++ b/docs/JS Avançado 1-resumo.pptx
@@ -7,8 +7,9 @@
   <p:sldIdLst>
     <p:sldId id="256" r:id="rId2"/>
     <p:sldId id="257" r:id="rId3"/>
-    <p:sldId id="258" r:id="rId4"/>
-    <p:sldId id="259" r:id="rId5"/>
+    <p:sldId id="260" r:id="rId4"/>
+    <p:sldId id="258" r:id="rId5"/>
+    <p:sldId id="259" r:id="rId6"/>
   </p:sldIdLst>
   <p:sldSz cx="12192000" cy="6858000"/>
   <p:notesSz cx="6858000" cy="9144000"/>
@@ -246,7 +247,7 @@
           <a:p>
             <a:fld id="{CC58B075-67F8-4A8D-AE1C-3D3E4193EBCA}" type="datetimeFigureOut">
               <a:rPr lang="pt-BR" smtClean="0"/>
-              <a:t>15/02/2019</a:t>
+              <a:t>28/02/2019</a:t>
             </a:fld>
             <a:endParaRPr lang="pt-BR"/>
           </a:p>
@@ -416,7 +417,7 @@
           <a:p>
             <a:fld id="{CC58B075-67F8-4A8D-AE1C-3D3E4193EBCA}" type="datetimeFigureOut">
               <a:rPr lang="pt-BR" smtClean="0"/>
-              <a:t>15/02/2019</a:t>
+              <a:t>28/02/2019</a:t>
             </a:fld>
             <a:endParaRPr lang="pt-BR"/>
           </a:p>
@@ -596,7 +597,7 @@
           <a:p>
             <a:fld id="{CC58B075-67F8-4A8D-AE1C-3D3E4193EBCA}" type="datetimeFigureOut">
               <a:rPr lang="pt-BR" smtClean="0"/>
-              <a:t>15/02/2019</a:t>
+              <a:t>28/02/2019</a:t>
             </a:fld>
             <a:endParaRPr lang="pt-BR"/>
           </a:p>
@@ -766,7 +767,7 @@
           <a:p>
             <a:fld id="{CC58B075-67F8-4A8D-AE1C-3D3E4193EBCA}" type="datetimeFigureOut">
               <a:rPr lang="pt-BR" smtClean="0"/>
-              <a:t>15/02/2019</a:t>
+              <a:t>28/02/2019</a:t>
             </a:fld>
             <a:endParaRPr lang="pt-BR"/>
           </a:p>
@@ -1012,7 +1013,7 @@
           <a:p>
             <a:fld id="{CC58B075-67F8-4A8D-AE1C-3D3E4193EBCA}" type="datetimeFigureOut">
               <a:rPr lang="pt-BR" smtClean="0"/>
-              <a:t>15/02/2019</a:t>
+              <a:t>28/02/2019</a:t>
             </a:fld>
             <a:endParaRPr lang="pt-BR"/>
           </a:p>
@@ -1244,7 +1245,7 @@
           <a:p>
             <a:fld id="{CC58B075-67F8-4A8D-AE1C-3D3E4193EBCA}" type="datetimeFigureOut">
               <a:rPr lang="pt-BR" smtClean="0"/>
-              <a:t>15/02/2019</a:t>
+              <a:t>28/02/2019</a:t>
             </a:fld>
             <a:endParaRPr lang="pt-BR"/>
           </a:p>
@@ -1611,7 +1612,7 @@
           <a:p>
             <a:fld id="{CC58B075-67F8-4A8D-AE1C-3D3E4193EBCA}" type="datetimeFigureOut">
               <a:rPr lang="pt-BR" smtClean="0"/>
-              <a:t>15/02/2019</a:t>
+              <a:t>28/02/2019</a:t>
             </a:fld>
             <a:endParaRPr lang="pt-BR"/>
           </a:p>
@@ -1729,7 +1730,7 @@
           <a:p>
             <a:fld id="{CC58B075-67F8-4A8D-AE1C-3D3E4193EBCA}" type="datetimeFigureOut">
               <a:rPr lang="pt-BR" smtClean="0"/>
-              <a:t>15/02/2019</a:t>
+              <a:t>28/02/2019</a:t>
             </a:fld>
             <a:endParaRPr lang="pt-BR"/>
           </a:p>
@@ -1824,7 +1825,7 @@
           <a:p>
             <a:fld id="{CC58B075-67F8-4A8D-AE1C-3D3E4193EBCA}" type="datetimeFigureOut">
               <a:rPr lang="pt-BR" smtClean="0"/>
-              <a:t>15/02/2019</a:t>
+              <a:t>28/02/2019</a:t>
             </a:fld>
             <a:endParaRPr lang="pt-BR"/>
           </a:p>
@@ -2101,7 +2102,7 @@
           <a:p>
             <a:fld id="{CC58B075-67F8-4A8D-AE1C-3D3E4193EBCA}" type="datetimeFigureOut">
               <a:rPr lang="pt-BR" smtClean="0"/>
-              <a:t>15/02/2019</a:t>
+              <a:t>28/02/2019</a:t>
             </a:fld>
             <a:endParaRPr lang="pt-BR"/>
           </a:p>
@@ -2354,7 +2355,7 @@
           <a:p>
             <a:fld id="{CC58B075-67F8-4A8D-AE1C-3D3E4193EBCA}" type="datetimeFigureOut">
               <a:rPr lang="pt-BR" smtClean="0"/>
-              <a:t>15/02/2019</a:t>
+              <a:t>28/02/2019</a:t>
             </a:fld>
             <a:endParaRPr lang="pt-BR"/>
           </a:p>
@@ -2567,7 +2568,7 @@
           <a:p>
             <a:fld id="{CC58B075-67F8-4A8D-AE1C-3D3E4193EBCA}" type="datetimeFigureOut">
               <a:rPr lang="pt-BR" smtClean="0"/>
-              <a:t>15/02/2019</a:t>
+              <a:t>28/02/2019</a:t>
             </a:fld>
             <a:endParaRPr lang="pt-BR"/>
           </a:p>
@@ -3210,7 +3211,6 @@
               <a:rPr lang="pt-BR" sz="1600" dirty="0" smtClean="0"/>
               <a:t> ( Interpolação)</a:t>
             </a:r>
-            <a:endParaRPr lang="pt-BR" sz="1600" dirty="0" smtClean="0"/>
           </a:p>
           <a:p>
             <a:pPr marL="342900" indent="-342900" algn="l">
@@ -3329,6 +3329,65 @@
             <p:ph type="ctrTitle"/>
           </p:nvPr>
         </p:nvSpPr>
+        <p:spPr/>
+        <p:txBody>
+          <a:bodyPr>
+            <a:normAutofit/>
+          </a:bodyPr>
+          <a:lstStyle/>
+          <a:p>
+            <a:r>
+              <a:rPr lang="pt-BR" sz="3600" dirty="0" smtClean="0"/>
+              <a:t>JS Avançado </a:t>
+            </a:r>
+            <a:r>
+              <a:rPr lang="pt-BR" sz="3600" dirty="0" smtClean="0"/>
+              <a:t>2</a:t>
+            </a:r>
+            <a:endParaRPr lang="pt-BR" sz="3600" dirty="0"/>
+          </a:p>
+        </p:txBody>
+      </p:sp>
+    </p:spTree>
+    <p:extLst>
+      <p:ext uri="{BB962C8B-B14F-4D97-AF65-F5344CB8AC3E}">
+        <p14:creationId xmlns:p14="http://schemas.microsoft.com/office/powerpoint/2010/main" val="40001937"/>
+      </p:ext>
+    </p:extLst>
+  </p:cSld>
+  <p:clrMapOvr>
+    <a:masterClrMapping/>
+  </p:clrMapOvr>
+</p:sld>
+</file>
+
+<file path=ppt/slides/slide4.xml><?xml version="1.0" encoding="utf-8"?>
+<p:sld xmlns:a="http://schemas.openxmlformats.org/drawingml/2006/main" xmlns:r="http://schemas.openxmlformats.org/officeDocument/2006/relationships" xmlns:p="http://schemas.openxmlformats.org/presentationml/2006/main">
+  <p:cSld>
+    <p:spTree>
+      <p:nvGrpSpPr>
+        <p:cNvPr id="1" name=""/>
+        <p:cNvGrpSpPr/>
+        <p:nvPr/>
+      </p:nvGrpSpPr>
+      <p:grpSpPr>
+        <a:xfrm>
+          <a:off x="0" y="0"/>
+          <a:ext cx="0" cy="0"/>
+          <a:chOff x="0" y="0"/>
+          <a:chExt cx="0" cy="0"/>
+        </a:xfrm>
+      </p:grpSpPr>
+      <p:sp>
+        <p:nvSpPr>
+          <p:cNvPr id="2" name="Título 1"/>
+          <p:cNvSpPr>
+            <a:spLocks noGrp="1"/>
+          </p:cNvSpPr>
+          <p:nvPr>
+            <p:ph type="ctrTitle"/>
+          </p:nvPr>
+        </p:nvSpPr>
         <p:spPr>
           <a:xfrm>
             <a:off x="816078" y="247292"/>
@@ -3384,7 +3443,7 @@
 </p:sld>
 </file>
 
-<file path=ppt/slides/slide4.xml><?xml version="1.0" encoding="utf-8"?>
+<file path=ppt/slides/slide5.xml><?xml version="1.0" encoding="utf-8"?>
 <p:sld xmlns:a="http://schemas.openxmlformats.org/drawingml/2006/main" xmlns:r="http://schemas.openxmlformats.org/officeDocument/2006/relationships" xmlns:p="http://schemas.openxmlformats.org/presentationml/2006/main">
   <p:cSld>
     <p:spTree>

</xml_diff>